<commit_message>
update 2.1: added cs
</commit_message>
<xml_diff>
--- a/pictures/pictures.pptx
+++ b/pictures/pictures.pptx
@@ -5,7 +5,7 @@
     <p:sldMasterId id="2147483648" r:id="rId1"/>
   </p:sldMasterIdLst>
   <p:notesMasterIdLst>
-    <p:notesMasterId r:id="rId20"/>
+    <p:notesMasterId r:id="rId21"/>
   </p:notesMasterIdLst>
   <p:sldIdLst>
     <p:sldId id="271" r:id="rId2"/>
@@ -22,10 +22,11 @@
     <p:sldId id="268" r:id="rId13"/>
     <p:sldId id="269" r:id="rId14"/>
     <p:sldId id="270" r:id="rId15"/>
-    <p:sldId id="260" r:id="rId16"/>
-    <p:sldId id="273" r:id="rId17"/>
-    <p:sldId id="258" r:id="rId18"/>
-    <p:sldId id="274" r:id="rId19"/>
+    <p:sldId id="275" r:id="rId16"/>
+    <p:sldId id="260" r:id="rId17"/>
+    <p:sldId id="273" r:id="rId18"/>
+    <p:sldId id="258" r:id="rId19"/>
+    <p:sldId id="274" r:id="rId20"/>
   </p:sldIdLst>
   <p:sldSz cx="9144000" cy="5143500" type="screen16x9"/>
   <p:notesSz cx="6858000" cy="9144000"/>
@@ -237,7 +238,7 @@
           <a:p>
             <a:fld id="{0A59A44E-30B9-4D48-86E3-9E867B758C41}" type="datetimeFigureOut">
               <a:rPr lang="en-US" smtClean="0"/>
-              <a:t>3/5/2023</a:t>
+              <a:t>8/30/2023</a:t>
             </a:fld>
             <a:endParaRPr lang="en-US"/>
           </a:p>
@@ -768,7 +769,7 @@
             <a:fld id="{1D8BD707-D9CF-40AE-B4C6-C98DA3205C09}" type="datetimeFigureOut">
               <a:rPr lang="en-US" smtClean="0"/>
               <a:pPr/>
-              <a:t>3/5/2023</a:t>
+              <a:t>8/30/2023</a:t>
             </a:fld>
             <a:endParaRPr lang="en-US"/>
           </a:p>
@@ -933,7 +934,7 @@
             <a:fld id="{1D8BD707-D9CF-40AE-B4C6-C98DA3205C09}" type="datetimeFigureOut">
               <a:rPr lang="en-US" smtClean="0"/>
               <a:pPr/>
-              <a:t>3/5/2023</a:t>
+              <a:t>8/30/2023</a:t>
             </a:fld>
             <a:endParaRPr lang="en-US"/>
           </a:p>
@@ -1108,7 +1109,7 @@
             <a:fld id="{1D8BD707-D9CF-40AE-B4C6-C98DA3205C09}" type="datetimeFigureOut">
               <a:rPr lang="en-US" smtClean="0"/>
               <a:pPr/>
-              <a:t>3/5/2023</a:t>
+              <a:t>8/30/2023</a:t>
             </a:fld>
             <a:endParaRPr lang="en-US"/>
           </a:p>
@@ -1273,7 +1274,7 @@
             <a:fld id="{1D8BD707-D9CF-40AE-B4C6-C98DA3205C09}" type="datetimeFigureOut">
               <a:rPr lang="en-US" smtClean="0"/>
               <a:pPr/>
-              <a:t>3/5/2023</a:t>
+              <a:t>8/30/2023</a:t>
             </a:fld>
             <a:endParaRPr lang="en-US"/>
           </a:p>
@@ -1515,7 +1516,7 @@
             <a:fld id="{1D8BD707-D9CF-40AE-B4C6-C98DA3205C09}" type="datetimeFigureOut">
               <a:rPr lang="en-US" smtClean="0"/>
               <a:pPr/>
-              <a:t>3/5/2023</a:t>
+              <a:t>8/30/2023</a:t>
             </a:fld>
             <a:endParaRPr lang="en-US"/>
           </a:p>
@@ -1797,7 +1798,7 @@
             <a:fld id="{1D8BD707-D9CF-40AE-B4C6-C98DA3205C09}" type="datetimeFigureOut">
               <a:rPr lang="en-US" smtClean="0"/>
               <a:pPr/>
-              <a:t>3/5/2023</a:t>
+              <a:t>8/30/2023</a:t>
             </a:fld>
             <a:endParaRPr lang="en-US"/>
           </a:p>
@@ -2213,7 +2214,7 @@
             <a:fld id="{1D8BD707-D9CF-40AE-B4C6-C98DA3205C09}" type="datetimeFigureOut">
               <a:rPr lang="en-US" smtClean="0"/>
               <a:pPr/>
-              <a:t>3/5/2023</a:t>
+              <a:t>8/30/2023</a:t>
             </a:fld>
             <a:endParaRPr lang="en-US"/>
           </a:p>
@@ -2327,7 +2328,7 @@
             <a:fld id="{1D8BD707-D9CF-40AE-B4C6-C98DA3205C09}" type="datetimeFigureOut">
               <a:rPr lang="en-US" smtClean="0"/>
               <a:pPr/>
-              <a:t>3/5/2023</a:t>
+              <a:t>8/30/2023</a:t>
             </a:fld>
             <a:endParaRPr lang="en-US"/>
           </a:p>
@@ -2419,7 +2420,7 @@
             <a:fld id="{1D8BD707-D9CF-40AE-B4C6-C98DA3205C09}" type="datetimeFigureOut">
               <a:rPr lang="en-US" smtClean="0"/>
               <a:pPr/>
-              <a:t>3/5/2023</a:t>
+              <a:t>8/30/2023</a:t>
             </a:fld>
             <a:endParaRPr lang="en-US"/>
           </a:p>
@@ -2691,7 +2692,7 @@
             <a:fld id="{1D8BD707-D9CF-40AE-B4C6-C98DA3205C09}" type="datetimeFigureOut">
               <a:rPr lang="en-US" smtClean="0"/>
               <a:pPr/>
-              <a:t>3/5/2023</a:t>
+              <a:t>8/30/2023</a:t>
             </a:fld>
             <a:endParaRPr lang="en-US"/>
           </a:p>
@@ -2940,7 +2941,7 @@
             <a:fld id="{1D8BD707-D9CF-40AE-B4C6-C98DA3205C09}" type="datetimeFigureOut">
               <a:rPr lang="en-US" smtClean="0"/>
               <a:pPr/>
-              <a:t>3/5/2023</a:t>
+              <a:t>8/30/2023</a:t>
             </a:fld>
             <a:endParaRPr lang="en-US"/>
           </a:p>
@@ -3151,7 +3152,7 @@
             <a:fld id="{1D8BD707-D9CF-40AE-B4C6-C98DA3205C09}" type="datetimeFigureOut">
               <a:rPr lang="en-US" smtClean="0"/>
               <a:pPr/>
-              <a:t>3/5/2023</a:t>
+              <a:t>8/30/2023</a:t>
             </a:fld>
             <a:endParaRPr lang="en-US"/>
           </a:p>
@@ -10585,7 +10586,13 @@
       </p:grpSpPr>
       <p:sp>
         <p:nvSpPr>
-          <p:cNvPr id="2" name="Rounded Rectangle 1"/>
+          <p:cNvPr id="3" name="Rounded Rectangle 2">
+            <a:extLst>
+              <a:ext uri="{FF2B5EF4-FFF2-40B4-BE49-F238E27FC236}">
+                <a16:creationId xmlns:a16="http://schemas.microsoft.com/office/drawing/2014/main" id="{11D320D1-2896-4C80-90AD-BF7EEAFFAE7D}"/>
+              </a:ext>
+            </a:extLst>
+          </p:cNvPr>
           <p:cNvSpPr>
             <a:spLocks noChangeAspect="1"/>
           </p:cNvSpPr>
@@ -10593,7 +10600,7 @@
         </p:nvSpPr>
         <p:spPr>
           <a:xfrm>
-            <a:off x="2651760" y="1611630"/>
+            <a:off x="2651759" y="1642110"/>
             <a:ext cx="3840480" cy="1920240"/>
           </a:xfrm>
           <a:prstGeom prst="roundRect">
@@ -10601,25 +10608,15 @@
               <a:gd name="adj" fmla="val 16126"/>
             </a:avLst>
           </a:prstGeom>
-          <a:gradFill flip="none" rotWithShape="1">
-            <a:gsLst>
-              <a:gs pos="100000">
-                <a:schemeClr val="bg1">
-                  <a:lumMod val="75000"/>
-                </a:schemeClr>
-              </a:gs>
-              <a:gs pos="31000">
-                <a:schemeClr val="bg1">
-                  <a:lumMod val="95000"/>
-                </a:schemeClr>
-              </a:gs>
-            </a:gsLst>
-            <a:lin ang="2700000" scaled="1"/>
-            <a:tileRect/>
-          </a:gradFill>
+          <a:solidFill>
+            <a:srgbClr val="FFC000">
+              <a:lumMod val="20000"/>
+              <a:lumOff val="80000"/>
+            </a:srgbClr>
+          </a:solidFill>
           <a:ln w="76200" cap="flat" cmpd="sng" algn="ctr">
             <a:solidFill>
-              <a:schemeClr val="tx1"/>
+              <a:srgbClr val="663300"/>
             </a:solidFill>
             <a:prstDash val="solid"/>
           </a:ln>
@@ -10757,6 +10754,760 @@
           </a:p>
         </p:txBody>
       </p:sp>
+      <p:pic>
+        <p:nvPicPr>
+          <p:cNvPr id="6" name="Picture 2">
+            <a:extLst>
+              <a:ext uri="{FF2B5EF4-FFF2-40B4-BE49-F238E27FC236}">
+                <a16:creationId xmlns:a16="http://schemas.microsoft.com/office/drawing/2014/main" id="{AD6539B8-46CB-7EBE-0790-6774170DF8C0}"/>
+              </a:ext>
+            </a:extLst>
+          </p:cNvPr>
+          <p:cNvPicPr>
+            <a:picLocks noChangeAspect="1" noChangeArrowheads="1"/>
+          </p:cNvPicPr>
+          <p:nvPr/>
+        </p:nvPicPr>
+        <p:blipFill>
+          <a:blip r:embed="rId2" cstate="print">
+            <a:duotone>
+              <a:schemeClr val="accent1">
+                <a:shade val="45000"/>
+                <a:satMod val="135000"/>
+              </a:schemeClr>
+              <a:prstClr val="white"/>
+            </a:duotone>
+            <a:extLst>
+              <a:ext uri="{28A0092B-C50C-407E-A947-70E740481C1C}">
+                <a14:useLocalDpi xmlns:a14="http://schemas.microsoft.com/office/drawing/2010/main" val="0"/>
+              </a:ext>
+            </a:extLst>
+          </a:blip>
+          <a:srcRect/>
+          <a:stretch>
+            <a:fillRect/>
+          </a:stretch>
+        </p:blipFill>
+        <p:spPr bwMode="auto">
+          <a:xfrm rot="754168">
+            <a:off x="4605582" y="1685913"/>
+            <a:ext cx="2716682" cy="1323439"/>
+          </a:xfrm>
+          <a:prstGeom prst="rect">
+            <a:avLst/>
+          </a:prstGeom>
+          <a:noFill/>
+          <a:extLst>
+            <a:ext uri="{909E8E84-426E-40DD-AFC4-6F175D3DCCD1}">
+              <a14:hiddenFill xmlns:a14="http://schemas.microsoft.com/office/drawing/2010/main">
+                <a:solidFill>
+                  <a:srgbClr val="FFFFFF"/>
+                </a:solidFill>
+              </a14:hiddenFill>
+            </a:ext>
+          </a:extLst>
+        </p:spPr>
+      </p:pic>
+      <p:sp>
+        <p:nvSpPr>
+          <p:cNvPr id="10" name="Rectangle 11">
+            <a:extLst>
+              <a:ext uri="{FF2B5EF4-FFF2-40B4-BE49-F238E27FC236}">
+                <a16:creationId xmlns:a16="http://schemas.microsoft.com/office/drawing/2014/main" id="{08B6CE21-1AE0-8FA6-1390-49C23F0E5ECB}"/>
+              </a:ext>
+            </a:extLst>
+          </p:cNvPr>
+          <p:cNvSpPr/>
+          <p:nvPr/>
+        </p:nvSpPr>
+        <p:spPr>
+          <a:xfrm rot="5400000">
+            <a:off x="4681929" y="1095759"/>
+            <a:ext cx="1920240" cy="2127102"/>
+          </a:xfrm>
+          <a:prstGeom prst="rect">
+            <a:avLst/>
+          </a:prstGeom>
+          <a:solidFill>
+            <a:srgbClr val="FFF2CC">
+              <a:alpha val="87843"/>
+            </a:srgbClr>
+          </a:solidFill>
+          <a:ln>
+            <a:noFill/>
+          </a:ln>
+        </p:spPr>
+        <p:style>
+          <a:lnRef idx="2">
+            <a:schemeClr val="accent1">
+              <a:shade val="50000"/>
+            </a:schemeClr>
+          </a:lnRef>
+          <a:fillRef idx="1">
+            <a:schemeClr val="accent1"/>
+          </a:fillRef>
+          <a:effectRef idx="0">
+            <a:schemeClr val="accent1"/>
+          </a:effectRef>
+          <a:fontRef idx="minor">
+            <a:schemeClr val="lt1"/>
+          </a:fontRef>
+        </p:style>
+        <p:txBody>
+          <a:bodyPr rtlCol="0" anchor="ctr"/>
+          <a:lstStyle/>
+          <a:p>
+            <a:pPr algn="ctr"/>
+            <a:endParaRPr lang="en-US"/>
+          </a:p>
+        </p:txBody>
+      </p:sp>
+      <p:pic>
+        <p:nvPicPr>
+          <p:cNvPr id="1028" name="Picture 4" descr="Robotic arm | Free SVG">
+            <a:extLst>
+              <a:ext uri="{FF2B5EF4-FFF2-40B4-BE49-F238E27FC236}">
+                <a16:creationId xmlns:a16="http://schemas.microsoft.com/office/drawing/2014/main" id="{2B5B65FE-AD9D-7DCE-E290-C4954D72FC98}"/>
+              </a:ext>
+            </a:extLst>
+          </p:cNvPr>
+          <p:cNvPicPr>
+            <a:picLocks noChangeAspect="1" noChangeArrowheads="1"/>
+          </p:cNvPicPr>
+          <p:nvPr/>
+        </p:nvPicPr>
+        <p:blipFill>
+          <a:blip r:embed="rId3">
+            <a:duotone>
+              <a:schemeClr val="accent1">
+                <a:shade val="45000"/>
+                <a:satMod val="135000"/>
+              </a:schemeClr>
+              <a:prstClr val="white"/>
+            </a:duotone>
+            <a:extLst>
+              <a:ext uri="{28A0092B-C50C-407E-A947-70E740481C1C}">
+                <a14:useLocalDpi xmlns:a14="http://schemas.microsoft.com/office/drawing/2010/main" val="0"/>
+              </a:ext>
+            </a:extLst>
+          </a:blip>
+          <a:srcRect/>
+          <a:stretch>
+            <a:fillRect/>
+          </a:stretch>
+        </p:blipFill>
+        <p:spPr bwMode="auto">
+          <a:xfrm>
+            <a:off x="1295400" y="533400"/>
+            <a:ext cx="3028950" cy="3028950"/>
+          </a:xfrm>
+          <a:prstGeom prst="rect">
+            <a:avLst/>
+          </a:prstGeom>
+          <a:noFill/>
+          <a:extLst>
+            <a:ext uri="{909E8E84-426E-40DD-AFC4-6F175D3DCCD1}">
+              <a14:hiddenFill xmlns:a14="http://schemas.microsoft.com/office/drawing/2010/main">
+                <a:solidFill>
+                  <a:srgbClr val="FFFFFF"/>
+                </a:solidFill>
+              </a14:hiddenFill>
+            </a:ext>
+          </a:extLst>
+        </p:spPr>
+      </p:pic>
+      <p:sp>
+        <p:nvSpPr>
+          <p:cNvPr id="13" name="Rectangle 11">
+            <a:extLst>
+              <a:ext uri="{FF2B5EF4-FFF2-40B4-BE49-F238E27FC236}">
+                <a16:creationId xmlns:a16="http://schemas.microsoft.com/office/drawing/2014/main" id="{ACAA5FE1-1173-813E-F005-608D97574E0F}"/>
+              </a:ext>
+            </a:extLst>
+          </p:cNvPr>
+          <p:cNvSpPr/>
+          <p:nvPr/>
+        </p:nvSpPr>
+        <p:spPr>
+          <a:xfrm rot="5400000">
+            <a:off x="1312298" y="27057"/>
+            <a:ext cx="1920240" cy="3230107"/>
+          </a:xfrm>
+          <a:prstGeom prst="rect">
+            <a:avLst/>
+          </a:prstGeom>
+          <a:solidFill>
+            <a:srgbClr val="FFF2CC">
+              <a:alpha val="85098"/>
+            </a:srgbClr>
+          </a:solidFill>
+          <a:ln>
+            <a:noFill/>
+          </a:ln>
+        </p:spPr>
+        <p:style>
+          <a:lnRef idx="2">
+            <a:schemeClr val="accent1">
+              <a:shade val="50000"/>
+            </a:schemeClr>
+          </a:lnRef>
+          <a:fillRef idx="1">
+            <a:schemeClr val="accent1"/>
+          </a:fillRef>
+          <a:effectRef idx="0">
+            <a:schemeClr val="accent1"/>
+          </a:effectRef>
+          <a:fontRef idx="minor">
+            <a:schemeClr val="lt1"/>
+          </a:fontRef>
+        </p:style>
+        <p:txBody>
+          <a:bodyPr rtlCol="0" anchor="ctr"/>
+          <a:lstStyle/>
+          <a:p>
+            <a:pPr algn="ctr"/>
+            <a:endParaRPr lang="en-US"/>
+          </a:p>
+        </p:txBody>
+      </p:sp>
+      <p:pic>
+        <p:nvPicPr>
+          <p:cNvPr id="1030" name="Picture 6">
+            <a:extLst>
+              <a:ext uri="{FF2B5EF4-FFF2-40B4-BE49-F238E27FC236}">
+                <a16:creationId xmlns:a16="http://schemas.microsoft.com/office/drawing/2014/main" id="{A33750FC-C3F6-A971-8EAE-427C6F3ED17D}"/>
+              </a:ext>
+            </a:extLst>
+          </p:cNvPr>
+          <p:cNvPicPr>
+            <a:picLocks noChangeAspect="1" noChangeArrowheads="1"/>
+          </p:cNvPicPr>
+          <p:nvPr/>
+        </p:nvPicPr>
+        <p:blipFill>
+          <a:blip r:embed="rId4" cstate="print">
+            <a:duotone>
+              <a:prstClr val="black"/>
+              <a:schemeClr val="accent1">
+                <a:tint val="45000"/>
+                <a:satMod val="400000"/>
+              </a:schemeClr>
+            </a:duotone>
+            <a:extLst>
+              <a:ext uri="{28A0092B-C50C-407E-A947-70E740481C1C}">
+                <a14:useLocalDpi xmlns:a14="http://schemas.microsoft.com/office/drawing/2010/main" val="0"/>
+              </a:ext>
+            </a:extLst>
+          </a:blip>
+          <a:srcRect/>
+          <a:stretch>
+            <a:fillRect/>
+          </a:stretch>
+        </p:blipFill>
+        <p:spPr bwMode="auto">
+          <a:xfrm rot="163332">
+            <a:off x="2267936" y="2922832"/>
+            <a:ext cx="2628900" cy="1035275"/>
+          </a:xfrm>
+          <a:prstGeom prst="rect">
+            <a:avLst/>
+          </a:prstGeom>
+          <a:noFill/>
+          <a:extLst>
+            <a:ext uri="{909E8E84-426E-40DD-AFC4-6F175D3DCCD1}">
+              <a14:hiddenFill xmlns:a14="http://schemas.microsoft.com/office/drawing/2010/main">
+                <a:solidFill>
+                  <a:srgbClr val="FFFFFF"/>
+                </a:solidFill>
+              </a14:hiddenFill>
+            </a:ext>
+          </a:extLst>
+        </p:spPr>
+      </p:pic>
+      <p:sp>
+        <p:nvSpPr>
+          <p:cNvPr id="14" name="Rectangle 11">
+            <a:extLst>
+              <a:ext uri="{FF2B5EF4-FFF2-40B4-BE49-F238E27FC236}">
+                <a16:creationId xmlns:a16="http://schemas.microsoft.com/office/drawing/2014/main" id="{76CC5A58-1638-41EF-2AD6-07A656B580E1}"/>
+              </a:ext>
+            </a:extLst>
+          </p:cNvPr>
+          <p:cNvSpPr/>
+          <p:nvPr/>
+        </p:nvSpPr>
+        <p:spPr>
+          <a:xfrm rot="5610001">
+            <a:off x="2959505" y="2061105"/>
+            <a:ext cx="1223201" cy="2891694"/>
+          </a:xfrm>
+          <a:prstGeom prst="rect">
+            <a:avLst/>
+          </a:prstGeom>
+          <a:solidFill>
+            <a:srgbClr val="FFF2CC">
+              <a:alpha val="83922"/>
+            </a:srgbClr>
+          </a:solidFill>
+          <a:ln>
+            <a:noFill/>
+          </a:ln>
+        </p:spPr>
+        <p:style>
+          <a:lnRef idx="2">
+            <a:schemeClr val="accent1">
+              <a:shade val="50000"/>
+            </a:schemeClr>
+          </a:lnRef>
+          <a:fillRef idx="1">
+            <a:schemeClr val="accent1"/>
+          </a:fillRef>
+          <a:effectRef idx="0">
+            <a:schemeClr val="accent1"/>
+          </a:effectRef>
+          <a:fontRef idx="minor">
+            <a:schemeClr val="lt1"/>
+          </a:fontRef>
+        </p:style>
+        <p:txBody>
+          <a:bodyPr rtlCol="0" anchor="ctr"/>
+          <a:lstStyle/>
+          <a:p>
+            <a:pPr algn="ctr"/>
+            <a:endParaRPr lang="en-US"/>
+          </a:p>
+        </p:txBody>
+      </p:sp>
+      <p:sp>
+        <p:nvSpPr>
+          <p:cNvPr id="2" name="Rounded Rectangle 20">
+            <a:extLst>
+              <a:ext uri="{FF2B5EF4-FFF2-40B4-BE49-F238E27FC236}">
+                <a16:creationId xmlns:a16="http://schemas.microsoft.com/office/drawing/2014/main" id="{4A0CFD6B-C4A0-42F8-BA15-FD66A8557F22}"/>
+              </a:ext>
+            </a:extLst>
+          </p:cNvPr>
+          <p:cNvSpPr>
+            <a:spLocks noChangeAspect="1"/>
+          </p:cNvSpPr>
+          <p:nvPr/>
+        </p:nvSpPr>
+        <p:spPr>
+          <a:xfrm>
+            <a:off x="2651759" y="1642110"/>
+            <a:ext cx="3840480" cy="1920240"/>
+          </a:xfrm>
+          <a:prstGeom prst="roundRect">
+            <a:avLst>
+              <a:gd name="adj" fmla="val 16126"/>
+            </a:avLst>
+          </a:prstGeom>
+          <a:noFill/>
+          <a:ln w="76200" cap="flat" cmpd="sng" algn="ctr">
+            <a:solidFill>
+              <a:srgbClr val="663300"/>
+            </a:solidFill>
+            <a:prstDash val="solid"/>
+          </a:ln>
+          <a:effectLst/>
+        </p:spPr>
+        <p:txBody>
+          <a:bodyPr rtlCol="0" anchor="ctr"/>
+          <a:lstStyle>
+            <a:defPPr>
+              <a:defRPr lang="en-US"/>
+            </a:defPPr>
+            <a:lvl1pPr marL="0" algn="l" defTabSz="914400" rtl="0" eaLnBrk="1" latinLnBrk="0" hangingPunct="1">
+              <a:defRPr sz="1800" kern="1200">
+                <a:solidFill>
+                  <a:schemeClr val="lt1"/>
+                </a:solidFill>
+                <a:latin typeface="+mn-lt"/>
+                <a:ea typeface="+mn-ea"/>
+                <a:cs typeface="+mn-cs"/>
+              </a:defRPr>
+            </a:lvl1pPr>
+            <a:lvl2pPr marL="457200" algn="l" defTabSz="914400" rtl="0" eaLnBrk="1" latinLnBrk="0" hangingPunct="1">
+              <a:defRPr sz="1800" kern="1200">
+                <a:solidFill>
+                  <a:schemeClr val="lt1"/>
+                </a:solidFill>
+                <a:latin typeface="+mn-lt"/>
+                <a:ea typeface="+mn-ea"/>
+                <a:cs typeface="+mn-cs"/>
+              </a:defRPr>
+            </a:lvl2pPr>
+            <a:lvl3pPr marL="914400" algn="l" defTabSz="914400" rtl="0" eaLnBrk="1" latinLnBrk="0" hangingPunct="1">
+              <a:defRPr sz="1800" kern="1200">
+                <a:solidFill>
+                  <a:schemeClr val="lt1"/>
+                </a:solidFill>
+                <a:latin typeface="+mn-lt"/>
+                <a:ea typeface="+mn-ea"/>
+                <a:cs typeface="+mn-cs"/>
+              </a:defRPr>
+            </a:lvl3pPr>
+            <a:lvl4pPr marL="1371600" algn="l" defTabSz="914400" rtl="0" eaLnBrk="1" latinLnBrk="0" hangingPunct="1">
+              <a:defRPr sz="1800" kern="1200">
+                <a:solidFill>
+                  <a:schemeClr val="lt1"/>
+                </a:solidFill>
+                <a:latin typeface="+mn-lt"/>
+                <a:ea typeface="+mn-ea"/>
+                <a:cs typeface="+mn-cs"/>
+              </a:defRPr>
+            </a:lvl4pPr>
+            <a:lvl5pPr marL="1828800" algn="l" defTabSz="914400" rtl="0" eaLnBrk="1" latinLnBrk="0" hangingPunct="1">
+              <a:defRPr sz="1800" kern="1200">
+                <a:solidFill>
+                  <a:schemeClr val="lt1"/>
+                </a:solidFill>
+                <a:latin typeface="+mn-lt"/>
+                <a:ea typeface="+mn-ea"/>
+                <a:cs typeface="+mn-cs"/>
+              </a:defRPr>
+            </a:lvl5pPr>
+            <a:lvl6pPr marL="2286000" algn="l" defTabSz="914400" rtl="0" eaLnBrk="1" latinLnBrk="0" hangingPunct="1">
+              <a:defRPr sz="1800" kern="1200">
+                <a:solidFill>
+                  <a:schemeClr val="lt1"/>
+                </a:solidFill>
+                <a:latin typeface="+mn-lt"/>
+                <a:ea typeface="+mn-ea"/>
+                <a:cs typeface="+mn-cs"/>
+              </a:defRPr>
+            </a:lvl6pPr>
+            <a:lvl7pPr marL="2743200" algn="l" defTabSz="914400" rtl="0" eaLnBrk="1" latinLnBrk="0" hangingPunct="1">
+              <a:defRPr sz="1800" kern="1200">
+                <a:solidFill>
+                  <a:schemeClr val="lt1"/>
+                </a:solidFill>
+                <a:latin typeface="+mn-lt"/>
+                <a:ea typeface="+mn-ea"/>
+                <a:cs typeface="+mn-cs"/>
+              </a:defRPr>
+            </a:lvl7pPr>
+            <a:lvl8pPr marL="3200400" algn="l" defTabSz="914400" rtl="0" eaLnBrk="1" latinLnBrk="0" hangingPunct="1">
+              <a:defRPr sz="1800" kern="1200">
+                <a:solidFill>
+                  <a:schemeClr val="lt1"/>
+                </a:solidFill>
+                <a:latin typeface="+mn-lt"/>
+                <a:ea typeface="+mn-ea"/>
+                <a:cs typeface="+mn-cs"/>
+              </a:defRPr>
+            </a:lvl8pPr>
+            <a:lvl9pPr marL="3657600" algn="l" defTabSz="914400" rtl="0" eaLnBrk="1" latinLnBrk="0" hangingPunct="1">
+              <a:defRPr sz="1800" kern="1200">
+                <a:solidFill>
+                  <a:schemeClr val="lt1"/>
+                </a:solidFill>
+                <a:latin typeface="+mn-lt"/>
+                <a:ea typeface="+mn-ea"/>
+                <a:cs typeface="+mn-cs"/>
+              </a:defRPr>
+            </a:lvl9pPr>
+          </a:lstStyle>
+          <a:p>
+            <a:pPr marL="0" marR="0" lvl="0" indent="0" algn="ctr" defTabSz="914400" rtl="0" eaLnBrk="1" fontAlgn="auto" latinLnBrk="0" hangingPunct="1">
+              <a:lnSpc>
+                <a:spcPct val="100000"/>
+              </a:lnSpc>
+              <a:spcBef>
+                <a:spcPts val="0"/>
+              </a:spcBef>
+              <a:spcAft>
+                <a:spcPts val="0"/>
+              </a:spcAft>
+              <a:buClrTx/>
+              <a:buSzTx/>
+              <a:buFontTx/>
+              <a:buNone/>
+              <a:tabLst/>
+              <a:defRPr/>
+            </a:pPr>
+            <a:endParaRPr kumimoji="0" lang="en-US" sz="1800" b="0" i="0" u="none" strike="noStrike" kern="1200" cap="none" spc="0" normalizeH="0" baseline="0" noProof="0">
+              <a:ln>
+                <a:noFill/>
+              </a:ln>
+              <a:solidFill>
+                <a:srgbClr val="FFC000"/>
+              </a:solidFill>
+              <a:effectLst/>
+              <a:uLnTx/>
+              <a:uFillTx/>
+              <a:latin typeface="Calibri"/>
+              <a:ea typeface="+mn-ea"/>
+              <a:cs typeface="+mn-cs"/>
+            </a:endParaRPr>
+          </a:p>
+        </p:txBody>
+      </p:sp>
+      <p:sp>
+        <p:nvSpPr>
+          <p:cNvPr id="4" name="TextBox 3">
+            <a:extLst>
+              <a:ext uri="{FF2B5EF4-FFF2-40B4-BE49-F238E27FC236}">
+                <a16:creationId xmlns:a16="http://schemas.microsoft.com/office/drawing/2014/main" id="{C728E205-CE39-4561-8681-6BAAD1AF6056}"/>
+              </a:ext>
+            </a:extLst>
+          </p:cNvPr>
+          <p:cNvSpPr txBox="1"/>
+          <p:nvPr/>
+        </p:nvSpPr>
+        <p:spPr>
+          <a:xfrm>
+            <a:off x="2651759" y="1962150"/>
+            <a:ext cx="3840480" cy="1323439"/>
+          </a:xfrm>
+          <a:prstGeom prst="rect">
+            <a:avLst/>
+          </a:prstGeom>
+          <a:noFill/>
+        </p:spPr>
+        <p:txBody>
+          <a:bodyPr wrap="square" rtlCol="0">
+            <a:spAutoFit/>
+          </a:bodyPr>
+          <a:lstStyle/>
+          <a:p>
+            <a:pPr algn="ctr"/>
+            <a:r>
+              <a:rPr lang="en-US" sz="4000" b="1" spc="300">
+                <a:solidFill>
+                  <a:schemeClr val="accent1">
+                    <a:lumMod val="75000"/>
+                  </a:schemeClr>
+                </a:solidFill>
+                <a:latin typeface="Courier New" panose="02070309020205020404" pitchFamily="49" charset="0"/>
+                <a:cs typeface="Courier New" panose="02070309020205020404" pitchFamily="49" charset="0"/>
+              </a:rPr>
+              <a:t>Computer Science</a:t>
+            </a:r>
+            <a:endParaRPr lang="en-US" sz="4000" b="1" spc="300" dirty="0">
+              <a:solidFill>
+                <a:schemeClr val="accent1">
+                  <a:lumMod val="75000"/>
+                </a:schemeClr>
+              </a:solidFill>
+              <a:latin typeface="Courier New" panose="02070309020205020404" pitchFamily="49" charset="0"/>
+              <a:cs typeface="Courier New" panose="02070309020205020404" pitchFamily="49" charset="0"/>
+            </a:endParaRPr>
+          </a:p>
+        </p:txBody>
+      </p:sp>
+    </p:spTree>
+    <p:extLst>
+      <p:ext uri="{BB962C8B-B14F-4D97-AF65-F5344CB8AC3E}">
+        <p14:creationId xmlns:p14="http://schemas.microsoft.com/office/powerpoint/2010/main" val="1049164803"/>
+      </p:ext>
+    </p:extLst>
+  </p:cSld>
+  <p:clrMapOvr>
+    <a:masterClrMapping/>
+  </p:clrMapOvr>
+</p:sld>
+</file>
+
+<file path=ppt/slides/slide16.xml><?xml version="1.0" encoding="utf-8"?>
+<p:sld xmlns:a="http://schemas.openxmlformats.org/drawingml/2006/main" xmlns:r="http://schemas.openxmlformats.org/officeDocument/2006/relationships" xmlns:p="http://schemas.openxmlformats.org/presentationml/2006/main">
+  <p:cSld>
+    <p:bg>
+      <p:bgPr>
+        <a:solidFill>
+          <a:schemeClr val="bg1"/>
+        </a:solidFill>
+        <a:effectLst/>
+      </p:bgPr>
+    </p:bg>
+    <p:spTree>
+      <p:nvGrpSpPr>
+        <p:cNvPr id="1" name=""/>
+        <p:cNvGrpSpPr/>
+        <p:nvPr/>
+      </p:nvGrpSpPr>
+      <p:grpSpPr>
+        <a:xfrm>
+          <a:off x="0" y="0"/>
+          <a:ext cx="0" cy="0"/>
+          <a:chOff x="0" y="0"/>
+          <a:chExt cx="0" cy="0"/>
+        </a:xfrm>
+      </p:grpSpPr>
+      <p:sp>
+        <p:nvSpPr>
+          <p:cNvPr id="2" name="Rounded Rectangle 1"/>
+          <p:cNvSpPr>
+            <a:spLocks noChangeAspect="1"/>
+          </p:cNvSpPr>
+          <p:nvPr/>
+        </p:nvSpPr>
+        <p:spPr>
+          <a:xfrm>
+            <a:off x="2651760" y="1611630"/>
+            <a:ext cx="3840480" cy="1920240"/>
+          </a:xfrm>
+          <a:prstGeom prst="roundRect">
+            <a:avLst>
+              <a:gd name="adj" fmla="val 16126"/>
+            </a:avLst>
+          </a:prstGeom>
+          <a:gradFill flip="none" rotWithShape="1">
+            <a:gsLst>
+              <a:gs pos="100000">
+                <a:schemeClr val="bg1">
+                  <a:lumMod val="75000"/>
+                </a:schemeClr>
+              </a:gs>
+              <a:gs pos="31000">
+                <a:schemeClr val="bg1">
+                  <a:lumMod val="95000"/>
+                </a:schemeClr>
+              </a:gs>
+            </a:gsLst>
+            <a:lin ang="2700000" scaled="1"/>
+            <a:tileRect/>
+          </a:gradFill>
+          <a:ln w="76200" cap="flat" cmpd="sng" algn="ctr">
+            <a:solidFill>
+              <a:schemeClr val="tx1"/>
+            </a:solidFill>
+            <a:prstDash val="solid"/>
+          </a:ln>
+          <a:effectLst/>
+        </p:spPr>
+        <p:txBody>
+          <a:bodyPr rtlCol="0" anchor="ctr"/>
+          <a:lstStyle>
+            <a:defPPr>
+              <a:defRPr lang="en-US"/>
+            </a:defPPr>
+            <a:lvl1pPr marL="0" algn="l" defTabSz="914400" rtl="0" eaLnBrk="1" latinLnBrk="0" hangingPunct="1">
+              <a:defRPr sz="1800" kern="1200">
+                <a:solidFill>
+                  <a:schemeClr val="lt1"/>
+                </a:solidFill>
+                <a:latin typeface="+mn-lt"/>
+                <a:ea typeface="+mn-ea"/>
+                <a:cs typeface="+mn-cs"/>
+              </a:defRPr>
+            </a:lvl1pPr>
+            <a:lvl2pPr marL="457200" algn="l" defTabSz="914400" rtl="0" eaLnBrk="1" latinLnBrk="0" hangingPunct="1">
+              <a:defRPr sz="1800" kern="1200">
+                <a:solidFill>
+                  <a:schemeClr val="lt1"/>
+                </a:solidFill>
+                <a:latin typeface="+mn-lt"/>
+                <a:ea typeface="+mn-ea"/>
+                <a:cs typeface="+mn-cs"/>
+              </a:defRPr>
+            </a:lvl2pPr>
+            <a:lvl3pPr marL="914400" algn="l" defTabSz="914400" rtl="0" eaLnBrk="1" latinLnBrk="0" hangingPunct="1">
+              <a:defRPr sz="1800" kern="1200">
+                <a:solidFill>
+                  <a:schemeClr val="lt1"/>
+                </a:solidFill>
+                <a:latin typeface="+mn-lt"/>
+                <a:ea typeface="+mn-ea"/>
+                <a:cs typeface="+mn-cs"/>
+              </a:defRPr>
+            </a:lvl3pPr>
+            <a:lvl4pPr marL="1371600" algn="l" defTabSz="914400" rtl="0" eaLnBrk="1" latinLnBrk="0" hangingPunct="1">
+              <a:defRPr sz="1800" kern="1200">
+                <a:solidFill>
+                  <a:schemeClr val="lt1"/>
+                </a:solidFill>
+                <a:latin typeface="+mn-lt"/>
+                <a:ea typeface="+mn-ea"/>
+                <a:cs typeface="+mn-cs"/>
+              </a:defRPr>
+            </a:lvl4pPr>
+            <a:lvl5pPr marL="1828800" algn="l" defTabSz="914400" rtl="0" eaLnBrk="1" latinLnBrk="0" hangingPunct="1">
+              <a:defRPr sz="1800" kern="1200">
+                <a:solidFill>
+                  <a:schemeClr val="lt1"/>
+                </a:solidFill>
+                <a:latin typeface="+mn-lt"/>
+                <a:ea typeface="+mn-ea"/>
+                <a:cs typeface="+mn-cs"/>
+              </a:defRPr>
+            </a:lvl5pPr>
+            <a:lvl6pPr marL="2286000" algn="l" defTabSz="914400" rtl="0" eaLnBrk="1" latinLnBrk="0" hangingPunct="1">
+              <a:defRPr sz="1800" kern="1200">
+                <a:solidFill>
+                  <a:schemeClr val="lt1"/>
+                </a:solidFill>
+                <a:latin typeface="+mn-lt"/>
+                <a:ea typeface="+mn-ea"/>
+                <a:cs typeface="+mn-cs"/>
+              </a:defRPr>
+            </a:lvl6pPr>
+            <a:lvl7pPr marL="2743200" algn="l" defTabSz="914400" rtl="0" eaLnBrk="1" latinLnBrk="0" hangingPunct="1">
+              <a:defRPr sz="1800" kern="1200">
+                <a:solidFill>
+                  <a:schemeClr val="lt1"/>
+                </a:solidFill>
+                <a:latin typeface="+mn-lt"/>
+                <a:ea typeface="+mn-ea"/>
+                <a:cs typeface="+mn-cs"/>
+              </a:defRPr>
+            </a:lvl7pPr>
+            <a:lvl8pPr marL="3200400" algn="l" defTabSz="914400" rtl="0" eaLnBrk="1" latinLnBrk="0" hangingPunct="1">
+              <a:defRPr sz="1800" kern="1200">
+                <a:solidFill>
+                  <a:schemeClr val="lt1"/>
+                </a:solidFill>
+                <a:latin typeface="+mn-lt"/>
+                <a:ea typeface="+mn-ea"/>
+                <a:cs typeface="+mn-cs"/>
+              </a:defRPr>
+            </a:lvl8pPr>
+            <a:lvl9pPr marL="3657600" algn="l" defTabSz="914400" rtl="0" eaLnBrk="1" latinLnBrk="0" hangingPunct="1">
+              <a:defRPr sz="1800" kern="1200">
+                <a:solidFill>
+                  <a:schemeClr val="lt1"/>
+                </a:solidFill>
+                <a:latin typeface="+mn-lt"/>
+                <a:ea typeface="+mn-ea"/>
+                <a:cs typeface="+mn-cs"/>
+              </a:defRPr>
+            </a:lvl9pPr>
+          </a:lstStyle>
+          <a:p>
+            <a:pPr marL="0" marR="0" lvl="0" indent="0" algn="ctr" defTabSz="914400" rtl="0" eaLnBrk="1" fontAlgn="auto" latinLnBrk="0" hangingPunct="1">
+              <a:lnSpc>
+                <a:spcPct val="100000"/>
+              </a:lnSpc>
+              <a:spcBef>
+                <a:spcPts val="0"/>
+              </a:spcBef>
+              <a:spcAft>
+                <a:spcPts val="0"/>
+              </a:spcAft>
+              <a:buClrTx/>
+              <a:buSzTx/>
+              <a:buFontTx/>
+              <a:buNone/>
+              <a:tabLst/>
+              <a:defRPr/>
+            </a:pPr>
+            <a:endParaRPr kumimoji="0" lang="en-US" sz="1800" b="0" i="0" u="none" strike="noStrike" kern="1200" cap="none" spc="0" normalizeH="0" baseline="0" noProof="0">
+              <a:ln>
+                <a:noFill/>
+              </a:ln>
+              <a:solidFill>
+                <a:srgbClr val="FFC000"/>
+              </a:solidFill>
+              <a:effectLst/>
+              <a:uLnTx/>
+              <a:uFillTx/>
+              <a:latin typeface="Calibri"/>
+              <a:ea typeface="+mn-ea"/>
+              <a:cs typeface="+mn-cs"/>
+            </a:endParaRPr>
+          </a:p>
+        </p:txBody>
+      </p:sp>
       <p:sp>
         <p:nvSpPr>
           <p:cNvPr id="3" name="TextBox 2"/>
@@ -11039,7 +11790,7 @@
 </p:sld>
 </file>
 
-<file path=ppt/slides/slide16.xml><?xml version="1.0" encoding="utf-8"?>
+<file path=ppt/slides/slide17.xml><?xml version="1.0" encoding="utf-8"?>
 <p:sld xmlns:a="http://schemas.openxmlformats.org/drawingml/2006/main" xmlns:r="http://schemas.openxmlformats.org/officeDocument/2006/relationships" xmlns:p="http://schemas.openxmlformats.org/presentationml/2006/main">
   <p:cSld>
     <p:spTree>
@@ -11171,7 +11922,7 @@
 </p:sld>
 </file>
 
-<file path=ppt/slides/slide17.xml><?xml version="1.0" encoding="utf-8"?>
+<file path=ppt/slides/slide18.xml><?xml version="1.0" encoding="utf-8"?>
 <p:sld xmlns:a="http://schemas.openxmlformats.org/drawingml/2006/main" xmlns:r="http://schemas.openxmlformats.org/officeDocument/2006/relationships" xmlns:p="http://schemas.openxmlformats.org/presentationml/2006/main">
   <p:cSld>
     <p:bg>
@@ -11209,7 +11960,7 @@
 </p:sld>
 </file>
 
-<file path=ppt/slides/slide18.xml><?xml version="1.0" encoding="utf-8"?>
+<file path=ppt/slides/slide19.xml><?xml version="1.0" encoding="utf-8"?>
 <p:sld xmlns:a="http://schemas.openxmlformats.org/drawingml/2006/main" xmlns:r="http://schemas.openxmlformats.org/officeDocument/2006/relationships" xmlns:p="http://schemas.openxmlformats.org/presentationml/2006/main">
   <p:cSld>
     <p:bg>
@@ -11234,42 +11985,82 @@
           <a:chExt cx="0" cy="0"/>
         </a:xfrm>
       </p:grpSpPr>
-      <p:sp>
-        <p:nvSpPr>
-          <p:cNvPr id="2" name="TextBox 1">
+      <p:pic>
+        <p:nvPicPr>
+          <p:cNvPr id="10" name="Picture 9">
             <a:extLst>
               <a:ext uri="{FF2B5EF4-FFF2-40B4-BE49-F238E27FC236}">
-                <a16:creationId xmlns:a16="http://schemas.microsoft.com/office/drawing/2014/main" id="{F2AD28DB-528D-A854-8A41-F1E72ABFF270}"/>
+                <a16:creationId xmlns:a16="http://schemas.microsoft.com/office/drawing/2014/main" id="{F02A521E-69FF-29FE-F48F-740CA755CDB8}"/>
               </a:ext>
             </a:extLst>
           </p:cNvPr>
-          <p:cNvSpPr txBox="1"/>
+          <p:cNvPicPr>
+            <a:picLocks noChangeAspect="1"/>
+          </p:cNvPicPr>
           <p:nvPr/>
-        </p:nvSpPr>
+        </p:nvPicPr>
+        <p:blipFill>
+          <a:blip r:embed="rId2">
+            <a:extLst>
+              <a:ext uri="{BEBA8EAE-BF5A-486C-A8C5-ECC9F3942E4B}">
+                <a14:imgProps xmlns:a14="http://schemas.microsoft.com/office/drawing/2010/main">
+                  <a14:imgLayer r:embed="rId3">
+                    <a14:imgEffect>
+                      <a14:backgroundRemoval t="5497" b="94503" l="4659" r="94908">
+                        <a14:foregroundMark x1="7151" y1="9302" x2="4225" y2="26638"/>
+                        <a14:foregroundMark x1="4225" y1="26638" x2="4659" y2="79493"/>
+                        <a14:foregroundMark x1="4659" y1="79493" x2="36945" y2="69556"/>
+                        <a14:foregroundMark x1="36945" y1="69556" x2="58505" y2="46089"/>
+                        <a14:foregroundMark x1="58505" y1="46089" x2="60563" y2="39535"/>
+                        <a14:foregroundMark x1="60563" y1="39535" x2="23185" y2="39323"/>
+                        <a14:foregroundMark x1="7584" y1="7611" x2="90358" y2="9725"/>
+                        <a14:foregroundMark x1="90358" y1="9725" x2="93608" y2="21776"/>
+                        <a14:foregroundMark x1="93608" y1="21776" x2="93824" y2="28541"/>
+                        <a14:foregroundMark x1="94475" y1="19239" x2="93283" y2="8034"/>
+                        <a14:foregroundMark x1="93283" y1="8034" x2="89707" y2="6342"/>
+                        <a14:foregroundMark x1="4442" y1="80550" x2="15385" y2="90486"/>
+                        <a14:foregroundMark x1="15385" y1="90486" x2="79632" y2="93446"/>
+                        <a14:foregroundMark x1="79740" y1="93446" x2="86999" y2="92178"/>
+                        <a14:foregroundMark x1="86999" y1="92178" x2="89057" y2="92178"/>
+                        <a14:foregroundMark x1="94583" y1="85201" x2="94908" y2="13319"/>
+                        <a14:foregroundMark x1="92958" y1="13108" x2="85807" y2="6131"/>
+                        <a14:foregroundMark x1="85807" y1="6131" x2="79632" y2="6765"/>
+                        <a14:foregroundMark x1="5417" y1="18182" x2="9101" y2="6977"/>
+                        <a14:foregroundMark x1="9101" y1="6977" x2="10509" y2="6342"/>
+                        <a14:foregroundMark x1="10834" y1="6342" x2="26219" y2="5497"/>
+                        <a14:foregroundMark x1="26219" y1="5497" x2="81473" y2="5497"/>
+                        <a14:foregroundMark x1="3900" y1="77378" x2="7042" y2="87738"/>
+                        <a14:foregroundMark x1="7042" y1="87738" x2="15385" y2="92600"/>
+                        <a14:foregroundMark x1="15385" y1="92600" x2="29878" y2="95384"/>
+                        <a14:foregroundMark x1="33979" y1="94127" x2="30986" y2="90909"/>
+                        <a14:foregroundMark x1="30986" y1="90909" x2="43120" y2="94503"/>
+                        <a14:foregroundMark x1="43120" y1="94503" x2="45829" y2="94080"/>
+                        <a14:foregroundMark x1="14843" y1="93023" x2="7476" y2="87104"/>
+                        <a14:foregroundMark x1="7476" y1="87104" x2="5092" y2="83087"/>
+                        <a14:backgroundMark x1="33261" y1="98520" x2="36945" y2="97674"/>
+                        <a14:backgroundMark x1="36078" y1="97252" x2="32828" y2="97040"/>
+                        <a14:backgroundMark x1="32719" y1="97040" x2="30336" y2="96829"/>
+                      </a14:backgroundRemoval>
+                    </a14:imgEffect>
+                  </a14:imgLayer>
+                </a14:imgProps>
+              </a:ext>
+            </a:extLst>
+          </a:blip>
+          <a:stretch>
+            <a:fillRect/>
+          </a:stretch>
+        </p:blipFill>
         <p:spPr>
           <a:xfrm>
-            <a:off x="3352800" y="1308616"/>
-            <a:ext cx="2209800" cy="646331"/>
+            <a:off x="176212" y="319087"/>
+            <a:ext cx="8791575" cy="4505325"/>
           </a:xfrm>
           <a:prstGeom prst="rect">
             <a:avLst/>
           </a:prstGeom>
-          <a:noFill/>
-        </p:spPr>
-        <p:txBody>
-          <a:bodyPr wrap="square" rtlCol="0">
-            <a:spAutoFit/>
-          </a:bodyPr>
-          <a:lstStyle/>
-          <a:p>
-            <a:pPr algn="ctr"/>
-            <a:r>
-              <a:rPr lang="en-US"/>
-              <a:t>Want To Donate to the creator?</a:t>
-            </a:r>
-          </a:p>
-        </p:txBody>
-      </p:sp>
+        </p:spPr>
+      </p:pic>
     </p:spTree>
     <p:extLst>
       <p:ext uri="{BB962C8B-B14F-4D97-AF65-F5344CB8AC3E}">

</xml_diff>